<commit_message>
Nagranie i prezentacja prawie skończona
</commit_message>
<xml_diff>
--- a/prezentacja.pptx
+++ b/prezentacja.pptx
@@ -14,7 +14,8 @@
     <p:sldId id="262" r:id="rId8"/>
     <p:sldId id="263" r:id="rId9"/>
     <p:sldId id="264" r:id="rId10"/>
-    <p:sldId id="265" r:id="rId11"/>
+    <p:sldId id="266" r:id="rId11"/>
+    <p:sldId id="265" r:id="rId12"/>
   </p:sldIdLst>
   <p:sldSz cx="9144000" cy="6858000" type="screen4x3"/>
   <p:notesSz cx="6858000" cy="9144000"/>
@@ -3966,19 +3967,89 @@
             <p:ph type="title"/>
           </p:nvPr>
         </p:nvSpPr>
-        <p:spPr/>
+        <p:spPr>
+          <a:xfrm>
+            <a:off x="467544" y="836712"/>
+            <a:ext cx="7772400" cy="762360"/>
+          </a:xfrm>
+        </p:spPr>
         <p:txBody>
           <a:bodyPr/>
           <a:lstStyle/>
           <a:p>
             <a:r>
               <a:rPr lang="pl-PL" dirty="0" smtClean="0"/>
-              <a:t>Klatka lub krótki film z 3D</a:t>
+              <a:t>NAGRANIE 3D</a:t>
             </a:r>
             <a:endParaRPr lang="pl-PL" dirty="0"/>
           </a:p>
         </p:txBody>
       </p:sp>
+    </p:spTree>
+    <p:extLst>
+      <p:ext uri="{BB962C8B-B14F-4D97-AF65-F5344CB8AC3E}">
+        <p14:creationId xmlns:p14="http://schemas.microsoft.com/office/powerpoint/2010/main" val="1222259999"/>
+      </p:ext>
+    </p:extLst>
+  </p:cSld>
+  <p:clrMapOvr>
+    <a:masterClrMapping/>
+  </p:clrMapOvr>
+  <p:timing>
+    <p:tnLst>
+      <p:par>
+        <p:cTn id="1" dur="indefinite" restart="never" nodeType="tmRoot"/>
+      </p:par>
+    </p:tnLst>
+  </p:timing>
+</p:sld>
+</file>
+
+<file path=ppt/slides/slide11.xml><?xml version="1.0" encoding="utf-8"?>
+<p:sld xmlns:a="http://schemas.openxmlformats.org/drawingml/2006/main" xmlns:r="http://schemas.openxmlformats.org/officeDocument/2006/relationships" xmlns:p="http://schemas.openxmlformats.org/presentationml/2006/main">
+  <p:cSld>
+    <p:spTree>
+      <p:nvGrpSpPr>
+        <p:cNvPr id="1" name=""/>
+        <p:cNvGrpSpPr/>
+        <p:nvPr/>
+      </p:nvGrpSpPr>
+      <p:grpSpPr>
+        <a:xfrm>
+          <a:off x="0" y="0"/>
+          <a:ext cx="0" cy="0"/>
+          <a:chOff x="0" y="0"/>
+          <a:chExt cx="0" cy="0"/>
+        </a:xfrm>
+      </p:grpSpPr>
+      <p:sp>
+        <p:nvSpPr>
+          <p:cNvPr id="2" name="Tytuł 1"/>
+          <p:cNvSpPr>
+            <a:spLocks noGrp="1"/>
+          </p:cNvSpPr>
+          <p:nvPr>
+            <p:ph type="title"/>
+          </p:nvPr>
+        </p:nvSpPr>
+        <p:spPr>
+          <a:xfrm>
+            <a:off x="467544" y="908720"/>
+            <a:ext cx="7772400" cy="762360"/>
+          </a:xfrm>
+        </p:spPr>
+        <p:txBody>
+          <a:bodyPr/>
+          <a:lstStyle/>
+          <a:p>
+            <a:r>
+              <a:rPr lang="pl-PL" dirty="0" smtClean="0"/>
+              <a:t>Komentarz do nagrania</a:t>
+            </a:r>
+            <a:endParaRPr lang="pl-PL" dirty="0"/>
+          </a:p>
+        </p:txBody>
+      </p:sp>
       <p:sp>
         <p:nvSpPr>
           <p:cNvPr id="3" name="Symbol zastępczy tekstu 2"/>
@@ -3989,18 +4060,28 @@
             <p:ph type="body" idx="1"/>
           </p:nvPr>
         </p:nvSpPr>
-        <p:spPr/>
-        <p:txBody>
-          <a:bodyPr/>
+        <p:spPr>
+          <a:xfrm>
+            <a:off x="530352" y="1772816"/>
+            <a:ext cx="7772400" cy="4608512"/>
+          </a:xfrm>
+        </p:spPr>
+        <p:txBody>
+          <a:bodyPr>
+            <a:normAutofit/>
+          </a:bodyPr>
           <a:lstStyle/>
           <a:p>
             <a:r>
               <a:rPr lang="pl-PL" dirty="0" smtClean="0"/>
-              <a:t>Potem opis do tego o co </a:t>
-            </a:r>
-            <a:r>
-              <a:rPr lang="pl-PL" dirty="0" err="1" smtClean="0"/>
-              <a:t>kaman</a:t>
+              <a:t>Obiekty widoczne na nagraniu wizualizacji mają różne kolory w celu odróżnienia budynków (kolor żółty), pojazdów (niebieski) oraz pieszych (czerwony). Rozważyliśmy także inne obiekty np. znaki lub inne obiekty oraz można wyświetlić je w innym kolorze. Opisanie drogi jako wielomian określonego rzędu </a:t>
+            </a:r>
+            <a:br>
+              <a:rPr lang="pl-PL" dirty="0" smtClean="0"/>
+            </a:br>
+            <a:r>
+              <a:rPr lang="pl-PL" dirty="0" smtClean="0"/>
+              <a:t>(w naszej wizualizacji wielomian 4 rzędu) pozwala na bardziej ogólne podejście do problemu, ponieważ zmiana współczynników wielomianu generuję nowy kształt drogi, dzięki czemu możemy generować różne konfiguracje.</a:t>
             </a:r>
             <a:endParaRPr lang="pl-PL" dirty="0"/>
           </a:p>
@@ -4212,11 +4293,7 @@
             </a:r>
             <a:r>
               <a:rPr lang="pl-PL" smtClean="0"/>
-              <a:t>różnych </a:t>
-            </a:r>
-            <a:r>
-              <a:rPr lang="pl-PL" smtClean="0"/>
-              <a:t>wymiarach.</a:t>
+              <a:t>różnych wymiarach.</a:t>
             </a:r>
             <a:endParaRPr lang="pl-PL" dirty="0" smtClean="0"/>
           </a:p>
@@ -4439,7 +4516,7 @@
         <p:spPr>
           <a:xfrm>
             <a:off x="530352" y="1988840"/>
-            <a:ext cx="7772400" cy="3960440"/>
+            <a:ext cx="7772400" cy="4536504"/>
           </a:xfrm>
         </p:spPr>
         <p:txBody>
@@ -4466,7 +4543,7 @@
             </a:r>
             <a:r>
               <a:rPr lang="pl-PL" dirty="0" smtClean="0"/>
-              <a:t>, a drugi do wczytania tego pliku i wizualizacji danych.</a:t>
+              <a:t>, a drugi do wczytania tego pliku i wizualizacji danych. Korzystaliśmy z funkcji plot() do wyświetlania obiektów w figurze.</a:t>
             </a:r>
             <a:endParaRPr lang="pl-PL" dirty="0"/>
           </a:p>
@@ -4634,14 +4711,35 @@
             <p:ph type="body" idx="1"/>
           </p:nvPr>
         </p:nvSpPr>
-        <p:spPr/>
-        <p:txBody>
-          <a:bodyPr/>
+        <p:spPr>
+          <a:xfrm>
+            <a:off x="530352" y="980728"/>
+            <a:ext cx="7772400" cy="5184576"/>
+          </a:xfrm>
+        </p:spPr>
+        <p:txBody>
+          <a:bodyPr>
+            <a:normAutofit/>
+          </a:bodyPr>
           <a:lstStyle/>
           <a:p>
             <a:r>
               <a:rPr lang="pl-PL" dirty="0" smtClean="0"/>
-              <a:t>Dwa prostokąty, pomiędzy niebieskimi prostymi symulującymi drogę, reprezentują dwa samochody. Z lewej strony widać pieszego, a u góry wyłania się większy obiekt, który jest budynkiem. TRZEBA COS JESZCZE DOPISAC</a:t>
+              <a:t>Dwa prostokąty, pomiędzy niebieskimi prostymi symulującymi drogę, reprezentują dwa samochody. Z lewej strony widać pieszego, a u góry wyłania się większy obiekt, który jest budynkiem. Takie przedstawienie obiektów było </a:t>
+            </a:r>
+            <a:br>
+              <a:rPr lang="pl-PL" dirty="0" smtClean="0"/>
+            </a:br>
+            <a:r>
+              <a:rPr lang="pl-PL" dirty="0" smtClean="0"/>
+              <a:t>w wymaganiach. Dzięki takiej reprezentacji można osiągnąć dużą czytelność obrazu i zobrazować tylko to, co jest istotne dla przekazu wizualizacji czyli pojazdy, znaki, budynki i piesi. </a:t>
+            </a:r>
+            <a:br>
+              <a:rPr lang="pl-PL" dirty="0" smtClean="0"/>
+            </a:br>
+            <a:r>
+              <a:rPr lang="pl-PL" dirty="0" smtClean="0"/>
+              <a:t>W przestrzeni dwuwymiarowej korzystamy z linii prostych obrazujących drogę, aby pokazać istotę problemu do zrealizowania. Przy generowaniu obiektów należało zwrócić uwagę na pozycję startową tak aby samochód znajdował się na drodze, a nie na budynku lub pieszym.</a:t>
             </a:r>
             <a:endParaRPr lang="pl-PL" dirty="0"/>
           </a:p>
@@ -4687,45 +4785,61 @@
             <p:ph type="title"/>
           </p:nvPr>
         </p:nvSpPr>
-        <p:spPr/>
+        <p:spPr>
+          <a:xfrm>
+            <a:off x="539552" y="836712"/>
+            <a:ext cx="7772400" cy="762360"/>
+          </a:xfrm>
+        </p:spPr>
         <p:txBody>
           <a:bodyPr/>
           <a:lstStyle/>
           <a:p>
             <a:r>
+              <a:rPr lang="pl-PL" sz="5400" dirty="0" smtClean="0"/>
+              <a:t>Zawartość pliku .mat</a:t>
+            </a:r>
+            <a:endParaRPr lang="pl-PL" sz="5400" dirty="0"/>
+          </a:p>
+        </p:txBody>
+      </p:sp>
+      <p:sp>
+        <p:nvSpPr>
+          <p:cNvPr id="3" name="Symbol zastępczy tekstu 2"/>
+          <p:cNvSpPr>
+            <a:spLocks noGrp="1"/>
+          </p:cNvSpPr>
+          <p:nvPr>
+            <p:ph type="body" idx="1"/>
+          </p:nvPr>
+        </p:nvSpPr>
+        <p:spPr>
+          <a:xfrm>
+            <a:off x="539552" y="1628800"/>
+            <a:ext cx="7772400" cy="4464496"/>
+          </a:xfrm>
+        </p:spPr>
+        <p:txBody>
+          <a:bodyPr>
+            <a:normAutofit/>
+          </a:bodyPr>
+          <a:lstStyle/>
+          <a:p>
+            <a:pPr>
+              <a:lnSpc>
+                <a:spcPct val="110000"/>
+              </a:lnSpc>
+            </a:pPr>
+            <a:r>
               <a:rPr lang="pl-PL" dirty="0" smtClean="0"/>
-              <a:t>Tu będzie opis struktury</a:t>
-            </a:r>
-            <a:endParaRPr lang="pl-PL" dirty="0"/>
-          </a:p>
-        </p:txBody>
-      </p:sp>
-      <p:sp>
-        <p:nvSpPr>
-          <p:cNvPr id="3" name="Symbol zastępczy tekstu 2"/>
-          <p:cNvSpPr>
-            <a:spLocks noGrp="1"/>
-          </p:cNvSpPr>
-          <p:nvPr>
-            <p:ph type="body" idx="1"/>
-          </p:nvPr>
-        </p:nvSpPr>
-        <p:spPr/>
-        <p:txBody>
-          <a:bodyPr/>
-          <a:lstStyle/>
-          <a:p>
-            <a:r>
+              <a:t>Do pliku zapisujemy strukturę, wektor czasu oraz wartości </a:t>
+            </a:r>
+            <a:br>
               <a:rPr lang="pl-PL" dirty="0" smtClean="0"/>
-              <a:t>I jakiś </a:t>
-            </a:r>
-            <a:r>
-              <a:rPr lang="pl-PL" dirty="0" err="1" smtClean="0"/>
-              <a:t>screen</a:t>
-            </a:r>
+            </a:br>
             <a:r>
               <a:rPr lang="pl-PL" dirty="0" smtClean="0"/>
-              <a:t> związany z nią</a:t>
+              <a:t>x i y funkcji opisującej drogę przy wizualizacji 3D. Zastosowaliśmy strukturę, ponieważ należało używać notacji kropki znanej z programowania w językach wysokiego poziomu tj. C++. Elementami tej struktury są współrzędne x, y, z obiektów dla każdej chwili czasu. Prędkość względem radaru (czyli pojazdu, na którym znajduje się radar) oraz widoczność, aby nie wyświetlać wszystkich obiektów cały czas oraz aby obiekty znajdujące się za radarem nie były w wizualizacji, ponieważ w rzeczywistości radar nie zbiera danych za nim.</a:t>
             </a:r>
             <a:endParaRPr lang="pl-PL" dirty="0"/>
           </a:p>
@@ -4773,7 +4887,7 @@
         </p:nvSpPr>
         <p:spPr>
           <a:xfrm>
-            <a:off x="539552" y="1052736"/>
+            <a:off x="539552" y="764704"/>
             <a:ext cx="7772400" cy="834368"/>
           </a:xfrm>
         </p:spPr>
@@ -4799,42 +4913,51 @@
             <p:ph type="body" idx="1"/>
           </p:nvPr>
         </p:nvSpPr>
-        <p:spPr/>
+        <p:spPr>
+          <a:xfrm>
+            <a:off x="530352" y="1700808"/>
+            <a:ext cx="7772400" cy="4464496"/>
+          </a:xfrm>
+        </p:spPr>
         <p:txBody>
           <a:bodyPr/>
           <a:lstStyle/>
           <a:p>
             <a:r>
+              <a:rPr lang="pl-PL" dirty="0" smtClean="0"/>
+              <a:t>Po wizualizacji w przestrzeni 2D zajęliśmy się przygotowaniem danych do przestrzeni trójwymiarowej. Dodaliśmy współrzędną z aby nadać wypukłości oraz została przygotowana funkcja </a:t>
+            </a:r>
+            <a:r>
               <a:rPr lang="pl-PL" dirty="0" err="1" smtClean="0"/>
-              <a:t>Ble</a:t>
+              <a:t>plotObj.m</a:t>
             </a:r>
             <a:r>
               <a:rPr lang="pl-PL" dirty="0" smtClean="0"/>
-              <a:t> </a:t>
+              <a:t>, która korzystając z wbudowanej funkcji </a:t>
             </a:r>
             <a:r>
               <a:rPr lang="pl-PL" dirty="0" err="1" smtClean="0"/>
-              <a:t>ble</a:t>
+              <a:t>patch</a:t>
             </a:r>
             <a:r>
               <a:rPr lang="pl-PL" dirty="0" smtClean="0"/>
-              <a:t> </a:t>
+              <a:t>() tworzyła prostopadłościan i wyświetlała go w figurze. Wykorzystując funkcje </a:t>
             </a:r>
             <a:r>
               <a:rPr lang="pl-PL" dirty="0" err="1" smtClean="0"/>
-              <a:t>ble</a:t>
+              <a:t>view</a:t>
             </a:r>
             <a:r>
               <a:rPr lang="pl-PL" dirty="0" smtClean="0"/>
-              <a:t> </a:t>
+              <a:t>(), </a:t>
             </a:r>
             <a:r>
               <a:rPr lang="pl-PL" dirty="0" err="1" smtClean="0"/>
-              <a:t>ble</a:t>
+              <a:t>camproj</a:t>
             </a:r>
             <a:r>
               <a:rPr lang="pl-PL" dirty="0" smtClean="0"/>
-              <a:t>…..</a:t>
+              <a:t>() oraz kąt patrzenia wyświetlaliśmy wszystkie widoczne obiekty</a:t>
             </a:r>
             <a:endParaRPr lang="pl-PL" dirty="0"/>
           </a:p>

</xml_diff>